<commit_message>
Alterações na apresentação final
</commit_message>
<xml_diff>
--- a/Documentos/Sprint 4 - Final/Apresentacao.pptx
+++ b/Documentos/Sprint 4 - Final/Apresentacao.pptx
@@ -8210,7 +8210,19 @@
             </a:r>
             <a:r>
               <a:rPr lang="pt-BR" dirty="0"/>
-              <a:t>na base, por serem os de menor granularidade e mais </a:t>
+              <a:t>na base, por serem os </a:t>
+            </a:r>
+            <a:r>
+              <a:rPr lang="pt-BR"/>
+              <a:t>de </a:t>
+            </a:r>
+            <a:r>
+              <a:rPr lang="pt-BR" smtClean="0"/>
+              <a:t>maior </a:t>
+            </a:r>
+            <a:r>
+              <a:rPr lang="pt-BR" dirty="0"/>
+              <a:t>granularidade e mais </a:t>
             </a:r>
             <a:r>
               <a:rPr lang="pt-BR" dirty="0" smtClean="0"/>

</xml_diff>